<commit_message>
Fix typo: "sofware" => "software"
</commit_message>
<xml_diff>
--- a/presentations/checkers-demo/checkers-demo-201504-cibse2015.pptx
+++ b/presentations/checkers-demo/checkers-demo-201504-cibse2015.pptx
@@ -279,7 +279,7 @@
             <a:fld id="{F1CB0A62-8E67-4C9C-BD0A-1B623B6FF41A}" type="datetimeFigureOut">
               <a:rPr lang="en-US" smtClean="0"/>
               <a:pPr/>
-              <a:t>4/23/2015</a:t>
+              <a:t>1/17/2016</a:t>
             </a:fld>
             <a:endParaRPr lang="en-US"/>
           </a:p>
@@ -446,7 +446,7 @@
             <a:fld id="{7E352BF5-329B-4DBF-99DF-ACF46ECAA31D}" type="datetimeFigureOut">
               <a:rPr lang="en-US" smtClean="0"/>
               <a:pPr/>
-              <a:t>4/23/2015</a:t>
+              <a:t>1/17/2016</a:t>
             </a:fld>
             <a:endParaRPr lang="en-US"/>
           </a:p>
@@ -2849,7 +2849,7 @@
             <a:fld id="{68E1BC78-26EE-F449-AB4E-4B63390B0AE5}" type="datetimeFigureOut">
               <a:rPr lang="nl-NL" smtClean="0"/>
               <a:pPr/>
-              <a:t>23-4-2015</a:t>
+              <a:t>17-1-2016</a:t>
             </a:fld>
             <a:endParaRPr lang="nl-NL"/>
           </a:p>
@@ -3145,7 +3145,7 @@
             <a:fld id="{68E1BC78-26EE-F449-AB4E-4B63390B0AE5}" type="datetimeFigureOut">
               <a:rPr lang="nl-NL" smtClean="0"/>
               <a:pPr/>
-              <a:t>23-4-2015</a:t>
+              <a:t>17-1-2016</a:t>
             </a:fld>
             <a:endParaRPr lang="nl-NL"/>
           </a:p>
@@ -3818,7 +3818,7 @@
             <a:fld id="{68E1BC78-26EE-F449-AB4E-4B63390B0AE5}" type="datetimeFigureOut">
               <a:rPr lang="nl-NL" smtClean="0"/>
               <a:pPr/>
-              <a:t>23-4-2015</a:t>
+              <a:t>17-1-2016</a:t>
             </a:fld>
             <a:endParaRPr lang="nl-NL" dirty="0"/>
           </a:p>
@@ -15125,7 +15125,7 @@
         <p:spPr>
           <a:xfrm>
             <a:off x="534588" y="1094614"/>
-            <a:ext cx="8205451" cy="4893647"/>
+            <a:ext cx="8279639" cy="4770537"/>
           </a:xfrm>
           <a:prstGeom prst="rect">
             <a:avLst/>
@@ -15146,12 +15146,12 @@
           <a:lstStyle/>
           <a:p>
             <a:r>
-              <a:rPr lang="en-US" sz="3600" dirty="0" err="1"/>
-              <a:t>Sofware</a:t>
+              <a:rPr lang="en-US" sz="3600" smtClean="0"/>
+              <a:t>Software </a:t>
             </a:r>
             <a:r>
               <a:rPr lang="en-US" sz="3600" dirty="0"/>
-              <a:t> bugs </a:t>
+              <a:t>bugs </a:t>
             </a:r>
             <a:r>
               <a:rPr lang="en-US" sz="3600" dirty="0" smtClean="0"/>

</xml_diff>